<commit_message>
updated lexical semantic slides, made public
</commit_message>
<xml_diff>
--- a/slides/WSTA_L8_lexical_semantics.pptx
+++ b/slides/WSTA_L8_lexical_semantics.pptx
@@ -5,7 +5,7 @@
     <p:sldMasterId id="2147483648" r:id="rId1"/>
   </p:sldMasterIdLst>
   <p:notesMasterIdLst>
-    <p:notesMasterId r:id="rId23"/>
+    <p:notesMasterId r:id="rId22"/>
   </p:notesMasterIdLst>
   <p:sldIdLst>
     <p:sldId id="256" r:id="rId2"/>
@@ -25,10 +25,9 @@
     <p:sldId id="270" r:id="rId16"/>
     <p:sldId id="273" r:id="rId17"/>
     <p:sldId id="271" r:id="rId18"/>
-    <p:sldId id="272" r:id="rId19"/>
-    <p:sldId id="275" r:id="rId20"/>
-    <p:sldId id="274" r:id="rId21"/>
-    <p:sldId id="276" r:id="rId22"/>
+    <p:sldId id="275" r:id="rId19"/>
+    <p:sldId id="274" r:id="rId20"/>
+    <p:sldId id="276" r:id="rId21"/>
   </p:sldIdLst>
   <p:sldSz cx="13004800" cy="9753600"/>
   <p:notesSz cx="6858000" cy="9144000"/>
@@ -893,7 +892,7 @@
           </a:ln>
           <a:extLst>
             <a:ext uri="{C572A759-6A51-4108-AA02-DFA0A04FC94B}">
-              <ma14:wrappingTextBoxFlag xmlns:ma14="http://schemas.microsoft.com/office/mac/drawingml/2011/main" xmlns="" val="1"/>
+              <ma14:wrappingTextBoxFlag xmlns="" xmlns:ma14="http://schemas.microsoft.com/office/mac/drawingml/2011/main" val="1"/>
             </a:ext>
           </a:extLst>
         </p:spPr>
@@ -2499,7 +2498,7 @@
           </a:ln>
           <a:extLst>
             <a:ext uri="{C572A759-6A51-4108-AA02-DFA0A04FC94B}">
-              <ma14:wrappingTextBoxFlag xmlns:ma14="http://schemas.microsoft.com/office/mac/drawingml/2011/main" xmlns="" val="1"/>
+              <ma14:wrappingTextBoxFlag xmlns="" xmlns:ma14="http://schemas.microsoft.com/office/mac/drawingml/2011/main" val="1"/>
             </a:ext>
           </a:extLst>
         </p:spPr>
@@ -2539,7 +2538,7 @@
           </a:ln>
           <a:extLst>
             <a:ext uri="{C572A759-6A51-4108-AA02-DFA0A04FC94B}">
-              <ma14:wrappingTextBoxFlag xmlns:ma14="http://schemas.microsoft.com/office/mac/drawingml/2011/main" xmlns="" val="1"/>
+              <ma14:wrappingTextBoxFlag xmlns="" xmlns:ma14="http://schemas.microsoft.com/office/mac/drawingml/2011/main" val="1"/>
             </a:ext>
           </a:extLst>
         </p:spPr>
@@ -3594,11 +3593,7 @@
             </a:r>
             <a:r>
               <a:rPr lang="en-AU" smtClean="0"/>
-              <a:t>LECTURE </a:t>
-            </a:r>
-            <a:r>
-              <a:rPr lang="en-AU" smtClean="0"/>
-              <a:t>4 </a:t>
+              <a:t>LECTURE 8 </a:t>
             </a:r>
             <a:endParaRPr dirty="0"/>
           </a:p>
@@ -4729,7 +4724,7 @@
           <a:graphicData uri="http://schemas.openxmlformats.org/presentationml/2006/ole">
             <mc:AlternateContent xmlns:mc="http://schemas.openxmlformats.org/markup-compatibility/2006">
               <mc:Choice xmlns:v="urn:schemas-microsoft-com:vml" Requires="v">
-                <p:oleObj spid="_x0000_s1154" name="Equation" r:id="rId4" imgW="1384200" imgH="533160" progId="Equation.3">
+                <p:oleObj spid="_x0000_s1178" name="Equation" r:id="rId4" imgW="1384200" imgH="533160" progId="Equation.3">
                   <p:embed/>
                 </p:oleObj>
               </mc:Choice>
@@ -4844,7 +4839,7 @@
           <a:graphicData uri="http://schemas.openxmlformats.org/presentationml/2006/ole">
             <mc:AlternateContent xmlns:mc="http://schemas.openxmlformats.org/markup-compatibility/2006">
               <mc:Choice xmlns:v="urn:schemas-microsoft-com:vml" Requires="v">
-                <p:oleObj spid="_x0000_s1155" name="Equation" r:id="rId7" imgW="1143000" imgH="203040" progId="Equation.3">
+                <p:oleObj spid="_x0000_s1179" name="Equation" r:id="rId7" imgW="1143000" imgH="203040" progId="Equation.3">
                   <p:embed/>
                 </p:oleObj>
               </mc:Choice>
@@ -5982,7 +5977,7 @@
           <a:p>
             <a:r>
               <a:rPr lang="en-AU" dirty="0" smtClean="0"/>
-              <a:t>Text Analysis Lexicons</a:t>
+              <a:t>Multiword Lexicons</a:t>
             </a:r>
             <a:endParaRPr lang="en-AU" dirty="0"/>
           </a:p>
@@ -6005,73 +6000,117 @@
           <a:p>
             <a:r>
               <a:rPr lang="en-AU" dirty="0" smtClean="0"/>
-              <a:t>MRC Psycholinguistic database</a:t>
+              <a:t>Many lexical items involve multiple words</a:t>
             </a:r>
           </a:p>
           <a:p>
             <a:pPr lvl="1"/>
             <a:r>
-              <a:rPr lang="en-AU" dirty="0" smtClean="0"/>
-              <a:t>Numerical scores on major psychological dimensions</a:t>
+              <a:rPr lang="en-AU" dirty="0"/>
+              <a:t>S</a:t>
+            </a:r>
+            <a:r>
+              <a:rPr lang="en-AU" dirty="0" smtClean="0"/>
+              <a:t>emantically </a:t>
+            </a:r>
+            <a:r>
+              <a:rPr lang="en-AU" i="1" dirty="0" smtClean="0"/>
+              <a:t>non-compositional</a:t>
+            </a:r>
+            <a:r>
+              <a:rPr lang="en-AU" dirty="0" smtClean="0"/>
+              <a:t> (United States ≠ United + States)</a:t>
             </a:r>
           </a:p>
           <a:p>
             <a:pPr lvl="1"/>
             <a:r>
               <a:rPr lang="en-AU" dirty="0" smtClean="0"/>
-              <a:t>Including familiarity, concreteness, </a:t>
+              <a:t>Sometimes non-contiguous (</a:t>
+            </a:r>
+            <a:r>
+              <a:rPr lang="en-AU" i="1" dirty="0" smtClean="0"/>
+              <a:t>take him/her/them for a ride</a:t>
+            </a:r>
+            <a:r>
+              <a:rPr lang="en-AU" dirty="0" smtClean="0"/>
+              <a:t>)</a:t>
+            </a:r>
+          </a:p>
+          <a:p>
+            <a:r>
+              <a:rPr lang="en-AU" dirty="0" smtClean="0"/>
+              <a:t>Both WordNet and </a:t>
             </a:r>
             <a:r>
               <a:rPr lang="en-AU" dirty="0" err="1" smtClean="0"/>
-              <a:t>imaginability</a:t>
-            </a:r>
-            <a:r>
-              <a:rPr lang="en-AU" dirty="0" smtClean="0"/>
-              <a:t>, meaningfulness</a:t>
+              <a:t>FrameNet</a:t>
+            </a:r>
+            <a:r>
+              <a:rPr lang="en-AU" dirty="0" smtClean="0"/>
+              <a:t> contain </a:t>
+            </a:r>
+            <a:r>
+              <a:rPr lang="en-AU" i="1" dirty="0" smtClean="0"/>
+              <a:t>multiword expressions </a:t>
+            </a:r>
+            <a:r>
+              <a:rPr lang="en-AU" dirty="0" smtClean="0"/>
+              <a:t>(MWEs)</a:t>
             </a:r>
           </a:p>
           <a:p>
             <a:pPr lvl="1"/>
             <a:r>
               <a:rPr lang="en-AU" dirty="0" smtClean="0"/>
-              <a:t>Used in </a:t>
-            </a:r>
-            <a:r>
-              <a:rPr lang="en-AU" dirty="0" err="1" smtClean="0"/>
-              <a:t>Cohmetrix</a:t>
-            </a:r>
-            <a:r>
-              <a:rPr lang="en-AU" dirty="0" smtClean="0"/>
-              <a:t> text analysis tool </a:t>
-            </a:r>
-          </a:p>
-          <a:p>
-            <a:r>
-              <a:rPr lang="en-AU" dirty="0" smtClean="0"/>
-              <a:t>Sentiment/emotion lexicons</a:t>
+              <a:t>But far from comprehensive</a:t>
+            </a:r>
+          </a:p>
+          <a:p>
+            <a:r>
+              <a:rPr lang="en-AU" dirty="0" smtClean="0"/>
+              <a:t>In fact, no comprehensive collection of  MWEs exists</a:t>
             </a:r>
           </a:p>
           <a:p>
             <a:pPr lvl="1"/>
             <a:r>
               <a:rPr lang="en-AU" dirty="0" smtClean="0"/>
-              <a:t>Many other sentiment-specific lexical resources out there</a:t>
-            </a:r>
-          </a:p>
-          <a:p>
-            <a:pPr lvl="1"/>
-            <a:r>
-              <a:rPr lang="en-AU" dirty="0" smtClean="0"/>
-              <a:t>More later in the course…</a:t>
-            </a:r>
-            <a:endParaRPr lang="en-AU" dirty="0"/>
+              <a:t>MWE/collocation identification is a classic NLP task</a:t>
+            </a:r>
+          </a:p>
+          <a:p>
+            <a:r>
+              <a:rPr lang="en-AU" dirty="0"/>
+              <a:t>S</a:t>
+            </a:r>
+            <a:r>
+              <a:rPr lang="en-AU" dirty="0" smtClean="0"/>
+              <a:t>ee </a:t>
+            </a:r>
+            <a:r>
+              <a:rPr lang="en-AU" dirty="0">
+                <a:hlinkClick r:id="rId2"/>
+              </a:rPr>
+              <a:t>http://www.cs.cmu.edu/~ark/LexSem</a:t>
+            </a:r>
+            <a:r>
+              <a:rPr lang="en-AU" dirty="0" smtClean="0">
+                <a:hlinkClick r:id="rId2"/>
+              </a:rPr>
+              <a:t>/</a:t>
+            </a:r>
+            <a:r>
+              <a:rPr lang="en-AU" dirty="0" smtClean="0"/>
+              <a:t> for a good collection taken from various sources</a:t>
+            </a:r>
           </a:p>
         </p:txBody>
       </p:sp>
     </p:spTree>
     <p:extLst>
       <p:ext uri="{BB962C8B-B14F-4D97-AF65-F5344CB8AC3E}">
-        <p14:creationId xmlns:p14="http://schemas.microsoft.com/office/powerpoint/2010/main" val="917685613"/>
+        <p14:creationId xmlns:p14="http://schemas.microsoft.com/office/powerpoint/2010/main" val="3500531402"/>
       </p:ext>
     </p:extLst>
   </p:cSld>
@@ -6118,7 +6157,7 @@
           <a:p>
             <a:r>
               <a:rPr lang="en-AU" dirty="0" smtClean="0"/>
-              <a:t>Multiword Lexicons</a:t>
+              <a:t>Moving on to the corpus</a:t>
             </a:r>
             <a:endParaRPr lang="en-AU" dirty="0"/>
           </a:p>
@@ -6141,117 +6180,32 @@
           <a:p>
             <a:r>
               <a:rPr lang="en-AU" dirty="0" smtClean="0"/>
-              <a:t>Many lexical items involve multiple words</a:t>
-            </a:r>
-          </a:p>
-          <a:p>
-            <a:pPr lvl="1"/>
+              <a:t>Manually-tagged lexical resources an important starting point for text analysis</a:t>
+            </a:r>
+          </a:p>
+          <a:p>
+            <a:r>
+              <a:rPr lang="en-AU" dirty="0" smtClean="0"/>
+              <a:t>But much modern work attempts to derive semantic information directly from corpora, without human intervention</a:t>
+            </a:r>
+          </a:p>
+          <a:p>
             <a:r>
               <a:rPr lang="en-AU" dirty="0"/>
-              <a:t>S</a:t>
-            </a:r>
-            <a:r>
-              <a:rPr lang="en-AU" dirty="0" smtClean="0"/>
-              <a:t>emantically </a:t>
-            </a:r>
-            <a:r>
-              <a:rPr lang="en-AU" i="1" dirty="0" smtClean="0"/>
-              <a:t>non-compositional</a:t>
-            </a:r>
-            <a:r>
-              <a:rPr lang="en-AU" dirty="0" smtClean="0"/>
-              <a:t> (United States ≠ United + States)</a:t>
-            </a:r>
-          </a:p>
-          <a:p>
-            <a:pPr lvl="1"/>
-            <a:r>
-              <a:rPr lang="en-AU" dirty="0" smtClean="0"/>
-              <a:t>Sometimes non-contiguous (</a:t>
-            </a:r>
-            <a:r>
-              <a:rPr lang="en-AU" i="1" dirty="0" smtClean="0"/>
-              <a:t>take him/her/them for a ride</a:t>
-            </a:r>
-            <a:r>
-              <a:rPr lang="en-AU" dirty="0" smtClean="0"/>
-              <a:t>)</a:t>
-            </a:r>
-          </a:p>
-          <a:p>
-            <a:r>
-              <a:rPr lang="en-AU" dirty="0" smtClean="0"/>
-              <a:t>Both WordNet and </a:t>
-            </a:r>
-            <a:r>
-              <a:rPr lang="en-AU" dirty="0" err="1" smtClean="0"/>
-              <a:t>FrameNet</a:t>
-            </a:r>
-            <a:r>
-              <a:rPr lang="en-AU" dirty="0" smtClean="0"/>
-              <a:t> contain </a:t>
-            </a:r>
-            <a:r>
-              <a:rPr lang="en-AU" i="1" dirty="0" smtClean="0"/>
-              <a:t>multiword expressions </a:t>
-            </a:r>
-            <a:r>
-              <a:rPr lang="en-AU" dirty="0" smtClean="0"/>
-              <a:t>(MWEs)</a:t>
-            </a:r>
-          </a:p>
-          <a:p>
-            <a:pPr lvl="1"/>
-            <a:r>
-              <a:rPr lang="en-AU" dirty="0" smtClean="0"/>
-              <a:t>But far from comprehensive</a:t>
-            </a:r>
-          </a:p>
-          <a:p>
-            <a:r>
-              <a:rPr lang="en-AU" dirty="0" smtClean="0"/>
-              <a:t>In fact, no comprehensive collection of  MWEs exists</a:t>
-            </a:r>
-          </a:p>
-          <a:p>
-            <a:pPr lvl="1"/>
-            <a:r>
-              <a:rPr lang="en-AU" dirty="0" smtClean="0"/>
-              <a:t>MWE/collocation identification is a classic NLP task</a:t>
-            </a:r>
-          </a:p>
-          <a:p>
-            <a:r>
-              <a:rPr lang="en-AU" dirty="0"/>
-              <a:t>S</a:t>
-            </a:r>
-            <a:r>
-              <a:rPr lang="en-AU" dirty="0" smtClean="0"/>
-              <a:t>ee </a:t>
-            </a:r>
-            <a:r>
-              <a:rPr lang="en-AU" dirty="0">
-                <a:hlinkClick r:id="rId2"/>
-              </a:rPr>
-              <a:t>http://www.cs.cmu.edu/~ark/LexSem</a:t>
-            </a:r>
-            <a:r>
-              <a:rPr lang="en-AU" dirty="0" smtClean="0">
-                <a:hlinkClick r:id="rId2"/>
-              </a:rPr>
-              <a:t>/</a:t>
-            </a:r>
-            <a:r>
-              <a:rPr lang="en-AU" dirty="0" smtClean="0"/>
-              <a:t> for a good collection taken from various sources</a:t>
-            </a:r>
+              <a:t>L</a:t>
+            </a:r>
+            <a:r>
+              <a:rPr lang="en-AU" dirty="0" smtClean="0"/>
+              <a:t>et’s add some distributional information</a:t>
+            </a:r>
+            <a:endParaRPr lang="en-AU" dirty="0"/>
           </a:p>
         </p:txBody>
       </p:sp>
     </p:spTree>
     <p:extLst>
       <p:ext uri="{BB962C8B-B14F-4D97-AF65-F5344CB8AC3E}">
-        <p14:creationId xmlns:p14="http://schemas.microsoft.com/office/powerpoint/2010/main" val="3500531402"/>
+        <p14:creationId xmlns:p14="http://schemas.microsoft.com/office/powerpoint/2010/main" val="3686082336"/>
       </p:ext>
     </p:extLst>
   </p:cSld>
@@ -6431,101 +6385,6 @@
           <a:p>
             <a:r>
               <a:rPr lang="en-AU" dirty="0" smtClean="0"/>
-              <a:t>Moving on to the corpus</a:t>
-            </a:r>
-            <a:endParaRPr lang="en-AU" dirty="0"/>
-          </a:p>
-        </p:txBody>
-      </p:sp>
-      <p:sp>
-        <p:nvSpPr>
-          <p:cNvPr id="3" name="Text Placeholder 2"/>
-          <p:cNvSpPr>
-            <a:spLocks noGrp="1"/>
-          </p:cNvSpPr>
-          <p:nvPr>
-            <p:ph type="body" idx="1"/>
-          </p:nvPr>
-        </p:nvSpPr>
-        <p:spPr/>
-        <p:txBody>
-          <a:bodyPr/>
-          <a:lstStyle/>
-          <a:p>
-            <a:r>
-              <a:rPr lang="en-AU" dirty="0" smtClean="0"/>
-              <a:t>Manually-tagged lexical resources an important starting point for text analysis</a:t>
-            </a:r>
-          </a:p>
-          <a:p>
-            <a:r>
-              <a:rPr lang="en-AU" dirty="0" smtClean="0"/>
-              <a:t>But much modern work attempts to derive semantic information directly from corpora, without human intervention</a:t>
-            </a:r>
-          </a:p>
-          <a:p>
-            <a:r>
-              <a:rPr lang="en-AU" dirty="0"/>
-              <a:t>L</a:t>
-            </a:r>
-            <a:r>
-              <a:rPr lang="en-AU" dirty="0" smtClean="0"/>
-              <a:t>et’s add some distributional information</a:t>
-            </a:r>
-            <a:endParaRPr lang="en-AU" dirty="0"/>
-          </a:p>
-        </p:txBody>
-      </p:sp>
-    </p:spTree>
-    <p:extLst>
-      <p:ext uri="{BB962C8B-B14F-4D97-AF65-F5344CB8AC3E}">
-        <p14:creationId xmlns:p14="http://schemas.microsoft.com/office/powerpoint/2010/main" val="3686082336"/>
-      </p:ext>
-    </p:extLst>
-  </p:cSld>
-  <p:clrMapOvr>
-    <a:masterClrMapping/>
-  </p:clrMapOvr>
-  <p:transition spd="med"/>
-</p:sld>
-</file>
-
-<file path=ppt/slides/slide21.xml><?xml version="1.0" encoding="utf-8"?>
-<p:sld xmlns:a="http://schemas.openxmlformats.org/drawingml/2006/main" xmlns:r="http://schemas.openxmlformats.org/officeDocument/2006/relationships" xmlns:p="http://schemas.openxmlformats.org/presentationml/2006/main">
-  <p:cSld>
-    <p:spTree>
-      <p:nvGrpSpPr>
-        <p:cNvPr id="1" name=""/>
-        <p:cNvGrpSpPr/>
-        <p:nvPr/>
-      </p:nvGrpSpPr>
-      <p:grpSpPr>
-        <a:xfrm>
-          <a:off x="0" y="0"/>
-          <a:ext cx="0" cy="0"/>
-          <a:chOff x="0" y="0"/>
-          <a:chExt cx="0" cy="0"/>
-        </a:xfrm>
-      </p:grpSpPr>
-      <p:sp>
-        <p:nvSpPr>
-          <p:cNvPr id="2" name="Title 1"/>
-          <p:cNvSpPr>
-            <a:spLocks noGrp="1"/>
-          </p:cNvSpPr>
-          <p:nvPr>
-            <p:ph type="title"/>
-          </p:nvPr>
-        </p:nvSpPr>
-        <p:spPr/>
-        <p:txBody>
-          <a:bodyPr>
-            <a:normAutofit fontScale="90000"/>
-          </a:bodyPr>
-          <a:lstStyle/>
-          <a:p>
-            <a:r>
-              <a:rPr lang="en-AU" dirty="0" smtClean="0"/>
               <a:t>Further reading</a:t>
             </a:r>
             <a:endParaRPr lang="en-AU" dirty="0"/>
@@ -6662,7 +6521,7 @@
             <a:pPr lvl="1"/>
             <a:r>
               <a:rPr lang="en-AU" dirty="0" smtClean="0"/>
-              <a:t>How the position of words in texts reflect their meaning</a:t>
+              <a:t>How words that appear together reflect their meaning</a:t>
             </a:r>
           </a:p>
           <a:p>
@@ -6929,16 +6788,13 @@
             </a:r>
             <a:r>
               <a:rPr lang="en-AU" sz="3300" dirty="0" smtClean="0"/>
-              <a:t> (generic), hyponyms/</a:t>
-            </a:r>
-            <a:r>
-              <a:rPr lang="en-AU" sz="3300" dirty="0" err="1" smtClean="0"/>
-              <a:t>troponyms</a:t>
+              <a:t> (generic), </a:t>
             </a:r>
             <a:r>
               <a:rPr lang="en-AU" sz="3300" dirty="0" smtClean="0"/>
-              <a:t> (specific/manner)</a:t>
-            </a:r>
+              <a:t>hyponyms (specific)</a:t>
+            </a:r>
+            <a:endParaRPr lang="en-AU" sz="3300" dirty="0" smtClean="0"/>
           </a:p>
           <a:p>
             <a:r>
@@ -6959,7 +6815,11 @@
             </a:r>
             <a:r>
               <a:rPr lang="en-AU" sz="3300" dirty="0" smtClean="0"/>
-              <a:t> (whole); entailment</a:t>
+              <a:t> (whole</a:t>
+            </a:r>
+            <a:r>
+              <a:rPr lang="en-AU" sz="3300" dirty="0" smtClean="0"/>
+              <a:t>)</a:t>
             </a:r>
             <a:endParaRPr lang="en-AU" sz="3300" dirty="0"/>
           </a:p>
@@ -8266,7 +8126,7 @@
           </a:ln>
           <a:extLst>
             <a:ext uri="{C572A759-6A51-4108-AA02-DFA0A04FC94B}">
-              <ma14:wrappingTextBoxFlag xmlns:ma14="http://schemas.microsoft.com/office/mac/drawingml/2011/main" xmlns="" val="1"/>
+              <ma14:wrappingTextBoxFlag xmlns="" xmlns:ma14="http://schemas.microsoft.com/office/mac/drawingml/2011/main" val="1"/>
             </a:ext>
           </a:extLst>
         </p:spPr>

</xml_diff>

<commit_message>
updated distributional semantics, primarily
</commit_message>
<xml_diff>
--- a/slides/WSTA_L8_lexical_semantics.pptx
+++ b/slides/WSTA_L8_lexical_semantics.pptx
@@ -4776,7 +4776,7 @@
           <a:graphicData uri="http://schemas.openxmlformats.org/presentationml/2006/ole">
             <mc:AlternateContent xmlns:mc="http://schemas.openxmlformats.org/markup-compatibility/2006">
               <mc:Choice xmlns:v="urn:schemas-microsoft-com:vml" Requires="v">
-                <p:oleObj spid="_x0000_s1236" name="Equation" r:id="rId4" imgW="1384200" imgH="533160" progId="Equation.3">
+                <p:oleObj spid="_x0000_s1246" name="Equation" r:id="rId4" imgW="1384200" imgH="533160" progId="Equation.3">
                   <p:embed/>
                 </p:oleObj>
               </mc:Choice>
@@ -4891,7 +4891,7 @@
           <a:graphicData uri="http://schemas.openxmlformats.org/presentationml/2006/ole">
             <mc:AlternateContent xmlns:mc="http://schemas.openxmlformats.org/markup-compatibility/2006">
               <mc:Choice xmlns:v="urn:schemas-microsoft-com:vml" Requires="v">
-                <p:oleObj spid="_x0000_s1237" name="Equation" r:id="rId7" imgW="1143000" imgH="203040" progId="Equation.3">
+                <p:oleObj spid="_x0000_s1247" name="Equation" r:id="rId7" imgW="1143000" imgH="203040" progId="Equation.3">
                   <p:embed/>
                 </p:oleObj>
               </mc:Choice>
@@ -5343,7 +5343,7 @@
       </p:par>
     </p:tnLst>
     <p:bldLst>
-      <p:bldP spid="3" grpId="0" uiExpand="1" build="p"/>
+      <p:bldP spid="3" grpId="0" uiExpand="1" build="p" animBg="1"/>
     </p:bldLst>
   </p:timing>
 </p:sld>
@@ -5467,11 +5467,7 @@
           <a:p>
             <a:r>
               <a:rPr lang="en-AU" dirty="0" smtClean="0"/>
-              <a:t>WordNet </a:t>
-            </a:r>
-            <a:r>
-              <a:rPr lang="en-AU" dirty="0" smtClean="0"/>
-              <a:t>as </a:t>
+              <a:t>WordNet as </a:t>
             </a:r>
             <a:r>
               <a:rPr lang="en-AU" dirty="0"/>
@@ -5574,13 +5570,8 @@
           <a:p>
             <a:r>
               <a:rPr lang="en-AU" dirty="0" smtClean="0"/>
-              <a:t>Apply standard machine </a:t>
-            </a:r>
-            <a:r>
-              <a:rPr lang="en-AU" dirty="0" smtClean="0"/>
-              <a:t>classifiers</a:t>
-            </a:r>
-            <a:endParaRPr lang="en-AU" dirty="0" smtClean="0"/>
+              <a:t>Apply standard machine classifiers</a:t>
+            </a:r>
           </a:p>
           <a:p>
             <a:r>
@@ -5605,16 +5596,11 @@
               <a:rPr lang="en-AU" dirty="0" smtClean="0"/>
               <a:t>)</a:t>
             </a:r>
-            <a:endParaRPr lang="en-AU" dirty="0" smtClean="0"/>
-          </a:p>
-          <a:p>
-            <a:r>
-              <a:rPr lang="en-AU" dirty="0" smtClean="0"/>
-              <a:t>Requires sense-tagged </a:t>
-            </a:r>
-            <a:r>
-              <a:rPr lang="en-AU" dirty="0" smtClean="0"/>
-              <a:t>corpora </a:t>
+          </a:p>
+          <a:p>
+            <a:r>
+              <a:rPr lang="en-AU" dirty="0" smtClean="0"/>
+              <a:t>Requires sense-tagged corpora </a:t>
             </a:r>
           </a:p>
           <a:p>
@@ -5723,25 +5709,8 @@
             </a:r>
             <a:r>
               <a:rPr lang="en-AU" dirty="0" smtClean="0"/>
-              <a:t>: </a:t>
-            </a:r>
-            <a:r>
-              <a:rPr lang="en-AU" dirty="0" smtClean="0"/>
-              <a:t>Choose sense whose</a:t>
-            </a:r>
-            <a:r>
-              <a:rPr lang="en-AU" dirty="0" smtClean="0"/>
-              <a:t> </a:t>
-            </a:r>
-            <a:r>
-              <a:rPr lang="en-AU" dirty="0" smtClean="0"/>
-              <a:t>dictionary gloss from </a:t>
-            </a:r>
-            <a:r>
-              <a:rPr lang="en-AU" dirty="0" smtClean="0"/>
-              <a:t>WordNet most overlaps with the context</a:t>
-            </a:r>
-            <a:endParaRPr lang="en-AU" dirty="0" smtClean="0"/>
+              <a:t>: Choose sense whose dictionary gloss from WordNet most overlaps with the context</a:t>
+            </a:r>
           </a:p>
           <a:p>
             <a:r>
@@ -5787,46 +5756,21 @@
             <a:pPr lvl="1"/>
             <a:r>
               <a:rPr lang="en-AU" dirty="0" smtClean="0"/>
-              <a:t>Iteratively expand training set with untagged </a:t>
-            </a:r>
-            <a:r>
-              <a:rPr lang="en-AU" dirty="0" smtClean="0"/>
-              <a:t>examples</a:t>
-            </a:r>
-            <a:endParaRPr lang="en-AU" dirty="0" smtClean="0"/>
+              <a:t>Iteratively expand training set with untagged examples</a:t>
+            </a:r>
           </a:p>
           <a:p>
             <a:pPr lvl="2"/>
             <a:r>
               <a:rPr lang="en-AU" dirty="0" smtClean="0"/>
-              <a:t>Train </a:t>
-            </a:r>
-            <a:r>
-              <a:rPr lang="en-AU" dirty="0" smtClean="0"/>
-              <a:t>a statistical classifier on current training </a:t>
-            </a:r>
-            <a:r>
-              <a:rPr lang="en-AU" dirty="0" smtClean="0"/>
-              <a:t>set</a:t>
+              <a:t>Train a statistical classifier on current training set</a:t>
             </a:r>
           </a:p>
           <a:p>
             <a:pPr lvl="2"/>
             <a:r>
               <a:rPr lang="en-AU" dirty="0" smtClean="0"/>
-              <a:t>A</a:t>
-            </a:r>
-            <a:r>
-              <a:rPr lang="en-AU" dirty="0" smtClean="0"/>
-              <a:t>dd </a:t>
-            </a:r>
-            <a:r>
-              <a:rPr lang="en-AU" dirty="0" smtClean="0"/>
-              <a:t>confidently predicted examples to training </a:t>
-            </a:r>
-            <a:r>
-              <a:rPr lang="en-AU" dirty="0" smtClean="0"/>
-              <a:t>set</a:t>
+              <a:t>Add confidently predicted examples to training set</a:t>
             </a:r>
           </a:p>
           <a:p>
@@ -5860,13 +5804,8 @@
             </a:r>
             <a:r>
               <a:rPr lang="en-AU" dirty="0" smtClean="0"/>
-              <a:t>methods in </a:t>
-            </a:r>
-            <a:r>
-              <a:rPr lang="en-AU" dirty="0" smtClean="0"/>
-              <a:t>WordNet</a:t>
-            </a:r>
-            <a:endParaRPr lang="en-AU" dirty="0" smtClean="0"/>
+              <a:t>methods in WordNet</a:t>
+            </a:r>
           </a:p>
           <a:p>
             <a:pPr marL="444500" lvl="1" indent="0">
@@ -6069,11 +6008,7 @@
           <a:p>
             <a:r>
               <a:rPr lang="en-AU" dirty="0" smtClean="0"/>
-              <a:t>Semantic </a:t>
-            </a:r>
-            <a:r>
-              <a:rPr lang="en-AU" dirty="0" smtClean="0"/>
-              <a:t>relationships among frames</a:t>
+              <a:t>Semantic relationships among frames</a:t>
             </a:r>
           </a:p>
           <a:p>
@@ -6220,15 +6155,7 @@
             <a:pPr lvl="1"/>
             <a:r>
               <a:rPr lang="en-AU" dirty="0" smtClean="0"/>
-              <a:t>Large </a:t>
-            </a:r>
-            <a:r>
-              <a:rPr lang="en-AU" dirty="0" smtClean="0"/>
-              <a:t>set of words </a:t>
-            </a:r>
-            <a:r>
-              <a:rPr lang="en-AU" dirty="0" smtClean="0"/>
-              <a:t>tagged for 150+ categories</a:t>
+              <a:t>Large set of words tagged for 150+ categories</a:t>
             </a:r>
           </a:p>
           <a:p>
@@ -6575,15 +6502,7 @@
           <a:p>
             <a:r>
               <a:rPr lang="en-AU" dirty="0" smtClean="0"/>
-              <a:t>In fact, no comprehensive collection </a:t>
-            </a:r>
-            <a:r>
-              <a:rPr lang="en-AU" dirty="0" smtClean="0"/>
-              <a:t>of </a:t>
-            </a:r>
-            <a:r>
-              <a:rPr lang="en-AU" dirty="0" smtClean="0"/>
-              <a:t>MWEs exists</a:t>
+              <a:t>In fact, no comprehensive collection of MWEs exists</a:t>
             </a:r>
           </a:p>
           <a:p>
@@ -7057,38 +6976,14 @@
           <a:p>
             <a:r>
               <a:rPr lang="en-AU" dirty="0" smtClean="0"/>
-              <a:t>Distributional </a:t>
-            </a:r>
-            <a:r>
-              <a:rPr lang="en-AU" dirty="0" smtClean="0"/>
-              <a:t>semantics</a:t>
+              <a:t>Distributional semantics</a:t>
             </a:r>
           </a:p>
           <a:p>
             <a:pPr lvl="1"/>
             <a:r>
               <a:rPr lang="en-AU" dirty="0" smtClean="0"/>
-              <a:t>How </a:t>
-            </a:r>
-            <a:r>
-              <a:rPr lang="en-AU" dirty="0" smtClean="0"/>
-              <a:t>word </a:t>
-            </a:r>
-            <a:r>
-              <a:rPr lang="en-AU" dirty="0" smtClean="0"/>
-              <a:t>co-occurrence</a:t>
-            </a:r>
-            <a:r>
-              <a:rPr lang="en-AU" dirty="0" smtClean="0"/>
-              <a:t> </a:t>
-            </a:r>
-            <a:r>
-              <a:rPr lang="en-AU" dirty="0" smtClean="0"/>
-              <a:t>reflect their </a:t>
-            </a:r>
-            <a:r>
-              <a:rPr lang="en-AU" dirty="0" smtClean="0"/>
-              <a:t>meaning</a:t>
+              <a:t>How word co-occurrence reflect their meaning</a:t>
             </a:r>
           </a:p>
           <a:p>
@@ -7397,15 +7292,7 @@
             </a:r>
             <a:r>
               <a:rPr lang="en-AU" sz="3300" dirty="0" smtClean="0"/>
-              <a:t> </a:t>
-            </a:r>
-            <a:r>
-              <a:rPr lang="en-AU" sz="3300" dirty="0" smtClean="0"/>
-              <a:t>(part</a:t>
-            </a:r>
-            <a:r>
-              <a:rPr lang="en-AU" sz="3300" dirty="0" smtClean="0"/>
-              <a:t>)</a:t>
+              <a:t> (part)</a:t>
             </a:r>
             <a:endParaRPr lang="en-AU" sz="3300" dirty="0"/>
           </a:p>
@@ -7567,15 +7454,7 @@
           <a:p>
             <a:r>
               <a:rPr lang="en-AU" dirty="0" smtClean="0"/>
-              <a:t>English WordNet includes ~120,000 nouns, ~12,000 verbs, </a:t>
-            </a:r>
-            <a:r>
-              <a:rPr lang="en-AU" dirty="0" smtClean="0"/>
-              <a:t>~21,000 adjectives, </a:t>
-            </a:r>
-            <a:r>
-              <a:rPr lang="en-AU" dirty="0" smtClean="0"/>
-              <a:t>~4,000 adverbs</a:t>
+              <a:t>English WordNet includes ~120,000 nouns, ~12,000 verbs, ~21,000 adjectives, ~4,000 adverbs</a:t>
             </a:r>
           </a:p>
           <a:p>
@@ -8259,7 +8138,9 @@
         </p:nvSpPr>
         <p:spPr/>
         <p:txBody>
-          <a:bodyPr/>
+          <a:bodyPr>
+            <a:normAutofit/>
+          </a:bodyPr>
           <a:lstStyle/>
           <a:p>
             <a:r>
@@ -8279,23 +8160,15 @@
             </a:pPr>
             <a:r>
               <a:rPr lang="en-AU" sz="2800" dirty="0"/>
-              <a:t>&gt;&gt;&gt; </a:t>
+              <a:t>&gt;&gt;&gt; print </a:t>
             </a:r>
             <a:r>
               <a:rPr lang="en-AU" sz="2800" dirty="0" err="1"/>
-              <a:t>nltk.corpus.wordnet.synsets</a:t>
+              <a:t>nltk.corpus.wordnet.lemmas</a:t>
             </a:r>
             <a:r>
               <a:rPr lang="en-AU" sz="2800" dirty="0"/>
-              <a:t>('relative')[0].</a:t>
-            </a:r>
-            <a:r>
-              <a:rPr lang="en-AU" sz="2800" dirty="0" err="1"/>
-              <a:t>hypernyms</a:t>
-            </a:r>
-            <a:r>
-              <a:rPr lang="en-AU" sz="2800" dirty="0" smtClean="0"/>
-              <a:t>()</a:t>
+              <a:t>(‘sister')[0].antonyms()</a:t>
             </a:r>
           </a:p>
           <a:p>
@@ -8304,20 +8177,13 @@
             </a:pPr>
             <a:r>
               <a:rPr lang="en-AU" sz="2000" dirty="0"/>
-              <a:t>[</a:t>
-            </a:r>
-            <a:r>
-              <a:rPr lang="en-AU" sz="2000" dirty="0" err="1"/>
-              <a:t>Synset</a:t>
-            </a:r>
-            <a:r>
-              <a:rPr lang="en-AU" sz="2000" dirty="0"/>
-              <a:t>('person.n.01</a:t>
+              <a:t>[Lemma('brother.n.01.brother</a:t>
             </a:r>
             <a:r>
               <a:rPr lang="en-AU" sz="2000" dirty="0" smtClean="0"/>
               <a:t>')]</a:t>
             </a:r>
+            <a:endParaRPr lang="en-AU" sz="2800" dirty="0" smtClean="0"/>
           </a:p>
           <a:p>
             <a:pPr marL="0" indent="0">
@@ -8332,26 +8198,17 @@
               <a:t>nltk.corpus.wordnet.synsets</a:t>
             </a:r>
             <a:r>
-              <a:rPr lang="en-AU" sz="2800" dirty="0" smtClean="0"/>
-              <a:t>(‘body')[</a:t>
-            </a:r>
-            <a:r>
               <a:rPr lang="en-AU" sz="2800" dirty="0"/>
-              <a:t>0</a:t>
-            </a:r>
-            <a:r>
-              <a:rPr lang="en-AU" sz="2800" dirty="0" smtClean="0"/>
-              <a:t>].</a:t>
-            </a:r>
-            <a:r>
-              <a:rPr lang="en-AU" sz="2800" dirty="0" err="1" smtClean="0"/>
-              <a:t>part_meronyms</a:t>
+              <a:t>('relative')[0].</a:t>
+            </a:r>
+            <a:r>
+              <a:rPr lang="en-AU" sz="2800" dirty="0" err="1"/>
+              <a:t>hypernyms</a:t>
             </a:r>
             <a:r>
               <a:rPr lang="en-AU" sz="2800" dirty="0" smtClean="0"/>
               <a:t>()</a:t>
             </a:r>
-            <a:endParaRPr lang="en-AU" sz="2800" dirty="0"/>
           </a:p>
           <a:p>
             <a:pPr marL="0" indent="0">
@@ -8367,155 +8224,11 @@
             </a:r>
             <a:r>
               <a:rPr lang="en-AU" sz="2000" dirty="0"/>
-              <a:t>('arm.n.01'), </a:t>
-            </a:r>
-            <a:r>
-              <a:rPr lang="en-AU" sz="2000" dirty="0" err="1"/>
-              <a:t>Synset</a:t>
-            </a:r>
-            <a:r>
-              <a:rPr lang="en-AU" sz="2000" dirty="0"/>
-              <a:t>('articulatory_system.n.01'), </a:t>
-            </a:r>
-            <a:r>
-              <a:rPr lang="en-AU" sz="2000" dirty="0" err="1"/>
-              <a:t>Synset</a:t>
-            </a:r>
-            <a:r>
-              <a:rPr lang="en-AU" sz="2000" dirty="0"/>
-              <a:t>('body_substance.n.01'), </a:t>
-            </a:r>
-            <a:r>
-              <a:rPr lang="en-AU" sz="2000" dirty="0" err="1"/>
-              <a:t>Synset</a:t>
-            </a:r>
-            <a:r>
-              <a:rPr lang="en-AU" sz="2000" dirty="0"/>
-              <a:t>('cavity.n.04'), </a:t>
-            </a:r>
-            <a:r>
-              <a:rPr lang="en-AU" sz="2000" dirty="0" err="1"/>
-              <a:t>Synset</a:t>
-            </a:r>
-            <a:r>
-              <a:rPr lang="en-AU" sz="2000" dirty="0"/>
-              <a:t>('circulatory_system.n.01'), </a:t>
-            </a:r>
-            <a:r>
-              <a:rPr lang="en-AU" sz="2000" dirty="0" err="1"/>
-              <a:t>Synset</a:t>
-            </a:r>
-            <a:r>
-              <a:rPr lang="en-AU" sz="2000" dirty="0"/>
-              <a:t>('crotch.n.02'), </a:t>
-            </a:r>
-            <a:r>
-              <a:rPr lang="en-AU" sz="2000" dirty="0" err="1"/>
-              <a:t>Synset</a:t>
-            </a:r>
-            <a:r>
-              <a:rPr lang="en-AU" sz="2000" dirty="0"/>
-              <a:t>('digestive_system.n.01'), </a:t>
-            </a:r>
-            <a:r>
-              <a:rPr lang="en-AU" sz="2000" dirty="0" err="1"/>
-              <a:t>Synset</a:t>
-            </a:r>
-            <a:r>
-              <a:rPr lang="en-AU" sz="2000" dirty="0"/>
-              <a:t>('endocrine_system.n.01'), </a:t>
-            </a:r>
-            <a:r>
-              <a:rPr lang="en-AU" sz="2000" dirty="0" err="1"/>
-              <a:t>Synset</a:t>
-            </a:r>
-            <a:r>
-              <a:rPr lang="en-AU" sz="2000" dirty="0"/>
-              <a:t>('head.n.01'), </a:t>
-            </a:r>
-            <a:r>
-              <a:rPr lang="en-AU" sz="2000" dirty="0" err="1"/>
-              <a:t>Synset</a:t>
-            </a:r>
-            <a:r>
-              <a:rPr lang="en-AU" sz="2000" dirty="0"/>
-              <a:t>('leg.n.01'), </a:t>
-            </a:r>
-            <a:r>
-              <a:rPr lang="en-AU" sz="2000" dirty="0" err="1"/>
-              <a:t>Synset</a:t>
-            </a:r>
-            <a:r>
-              <a:rPr lang="en-AU" sz="2000" dirty="0"/>
-              <a:t>('lymphatic_system.n.01'), </a:t>
-            </a:r>
-            <a:r>
-              <a:rPr lang="en-AU" sz="2000" dirty="0" err="1"/>
-              <a:t>Synset</a:t>
-            </a:r>
-            <a:r>
-              <a:rPr lang="en-AU" sz="2000" dirty="0"/>
-              <a:t>('musculoskeletal_system.n.01'), </a:t>
-            </a:r>
-            <a:r>
-              <a:rPr lang="en-AU" sz="2000" dirty="0" err="1"/>
-              <a:t>Synset</a:t>
-            </a:r>
-            <a:r>
-              <a:rPr lang="en-AU" sz="2000" dirty="0"/>
-              <a:t>('neck.n.01'), </a:t>
-            </a:r>
-            <a:r>
-              <a:rPr lang="en-AU" sz="2000" dirty="0" err="1"/>
-              <a:t>Synset</a:t>
-            </a:r>
-            <a:r>
-              <a:rPr lang="en-AU" sz="2000" dirty="0"/>
-              <a:t>('nervous_system.n.01'), </a:t>
-            </a:r>
-            <a:r>
-              <a:rPr lang="en-AU" sz="2000" dirty="0" err="1"/>
-              <a:t>Synset</a:t>
-            </a:r>
-            <a:r>
-              <a:rPr lang="en-AU" sz="2000" dirty="0"/>
-              <a:t>('pressure_point.n.01'), </a:t>
-            </a:r>
-            <a:r>
-              <a:rPr lang="en-AU" sz="2000" dirty="0" err="1"/>
-              <a:t>Synset</a:t>
-            </a:r>
-            <a:r>
-              <a:rPr lang="en-AU" sz="2000" dirty="0"/>
-              <a:t>('respiratory_system.n.01'), </a:t>
-            </a:r>
-            <a:r>
-              <a:rPr lang="en-AU" sz="2000" dirty="0" err="1"/>
-              <a:t>Synset</a:t>
-            </a:r>
-            <a:r>
-              <a:rPr lang="en-AU" sz="2000" dirty="0"/>
-              <a:t>('sensory_system.n.02'), </a:t>
-            </a:r>
-            <a:r>
-              <a:rPr lang="en-AU" sz="2000" dirty="0" err="1"/>
-              <a:t>Synset</a:t>
-            </a:r>
-            <a:r>
-              <a:rPr lang="en-AU" sz="2000" dirty="0"/>
-              <a:t>('torso.n.01'), </a:t>
-            </a:r>
-            <a:r>
-              <a:rPr lang="en-AU" sz="2000" dirty="0" err="1"/>
-              <a:t>Synset</a:t>
-            </a:r>
-            <a:r>
-              <a:rPr lang="en-AU" sz="2000" dirty="0"/>
-              <a:t>(</a:t>
+              <a:t>('person.n.01</a:t>
             </a:r>
             <a:r>
               <a:rPr lang="en-AU" sz="2000" dirty="0" smtClean="0"/>
-              <a:t>'vascular_system.n.01')]</a:t>
+              <a:t>')]</a:t>
             </a:r>
           </a:p>
           <a:p>
@@ -8523,17 +8236,34 @@
               <a:buNone/>
             </a:pPr>
             <a:r>
+              <a:rPr lang="en-AU" sz="2800" dirty="0" smtClean="0"/>
+              <a:t>&gt;&gt;&gt; </a:t>
+            </a:r>
+            <a:r>
+              <a:rPr lang="en-AU" sz="2800" dirty="0" err="1"/>
+              <a:t>nltk.corpus.wordnet.synsets</a:t>
+            </a:r>
+            <a:r>
+              <a:rPr lang="en-AU" sz="2800" dirty="0" smtClean="0"/>
+              <a:t>(‘body')[</a:t>
+            </a:r>
+            <a:r>
               <a:rPr lang="en-AU" sz="2800" dirty="0"/>
-              <a:t>&gt;&gt;&gt; print </a:t>
-            </a:r>
-            <a:r>
-              <a:rPr lang="en-AU" sz="2800" dirty="0" err="1"/>
-              <a:t>nltk.corpus.wordnet.lemmas</a:t>
+              <a:t>0</a:t>
             </a:r>
             <a:r>
               <a:rPr lang="en-AU" sz="2800" dirty="0" smtClean="0"/>
-              <a:t>(‘sister')[0].antonyms()</a:t>
-            </a:r>
+              <a:t>].</a:t>
+            </a:r>
+            <a:r>
+              <a:rPr lang="en-AU" sz="2800" dirty="0" err="1" smtClean="0"/>
+              <a:t>part_meronyms</a:t>
+            </a:r>
+            <a:r>
+              <a:rPr lang="en-AU" sz="2800" dirty="0" smtClean="0"/>
+              <a:t>()</a:t>
+            </a:r>
+            <a:endParaRPr lang="en-AU" sz="2800" dirty="0"/>
           </a:p>
           <a:p>
             <a:pPr marL="0" indent="0">
@@ -8541,9 +8271,164 @@
             </a:pPr>
             <a:r>
               <a:rPr lang="en-AU" sz="2000" dirty="0"/>
-              <a:t>[Lemma('brother.n.01.brother')]</a:t>
-            </a:r>
-            <a:endParaRPr lang="en-AU" sz="2000" dirty="0" smtClean="0"/>
+              <a:t>[</a:t>
+            </a:r>
+            <a:r>
+              <a:rPr lang="en-AU" sz="2000" dirty="0" err="1"/>
+              <a:t>Synset</a:t>
+            </a:r>
+            <a:r>
+              <a:rPr lang="en-AU" sz="2000" dirty="0"/>
+              <a:t>('arm.n.01'), </a:t>
+            </a:r>
+            <a:r>
+              <a:rPr lang="en-AU" sz="2000" dirty="0" err="1"/>
+              <a:t>Synset</a:t>
+            </a:r>
+            <a:r>
+              <a:rPr lang="en-AU" sz="2000" dirty="0"/>
+              <a:t>('articulatory_system.n.01'), </a:t>
+            </a:r>
+            <a:r>
+              <a:rPr lang="en-AU" sz="2000" dirty="0" err="1"/>
+              <a:t>Synset</a:t>
+            </a:r>
+            <a:r>
+              <a:rPr lang="en-AU" sz="2000" dirty="0"/>
+              <a:t>('body_substance.n.01'), </a:t>
+            </a:r>
+            <a:r>
+              <a:rPr lang="en-AU" sz="2000" dirty="0" err="1"/>
+              <a:t>Synset</a:t>
+            </a:r>
+            <a:r>
+              <a:rPr lang="en-AU" sz="2000" dirty="0"/>
+              <a:t>('cavity.n.04'), </a:t>
+            </a:r>
+            <a:r>
+              <a:rPr lang="en-AU" sz="2000" dirty="0" err="1"/>
+              <a:t>Synset</a:t>
+            </a:r>
+            <a:r>
+              <a:rPr lang="en-AU" sz="2000" dirty="0"/>
+              <a:t>('circulatory_system.n.01'), </a:t>
+            </a:r>
+            <a:r>
+              <a:rPr lang="en-AU" sz="2000" dirty="0" err="1"/>
+              <a:t>Synset</a:t>
+            </a:r>
+            <a:r>
+              <a:rPr lang="en-AU" sz="2000" dirty="0"/>
+              <a:t>('crotch.n.02'), </a:t>
+            </a:r>
+            <a:r>
+              <a:rPr lang="en-AU" sz="2000" dirty="0" err="1"/>
+              <a:t>Synset</a:t>
+            </a:r>
+            <a:r>
+              <a:rPr lang="en-AU" sz="2000" dirty="0"/>
+              <a:t>('digestive_system.n.01'), </a:t>
+            </a:r>
+            <a:r>
+              <a:rPr lang="en-AU" sz="2000" dirty="0" err="1"/>
+              <a:t>Synset</a:t>
+            </a:r>
+            <a:r>
+              <a:rPr lang="en-AU" sz="2000" dirty="0"/>
+              <a:t>('endocrine_system.n.01'), </a:t>
+            </a:r>
+            <a:r>
+              <a:rPr lang="en-AU" sz="2000" dirty="0" err="1"/>
+              <a:t>Synset</a:t>
+            </a:r>
+            <a:r>
+              <a:rPr lang="en-AU" sz="2000" dirty="0"/>
+              <a:t>('head.n.01'), </a:t>
+            </a:r>
+            <a:r>
+              <a:rPr lang="en-AU" sz="2000" dirty="0" err="1"/>
+              <a:t>Synset</a:t>
+            </a:r>
+            <a:r>
+              <a:rPr lang="en-AU" sz="2000" dirty="0"/>
+              <a:t>('leg.n.01'), </a:t>
+            </a:r>
+            <a:r>
+              <a:rPr lang="en-AU" sz="2000" dirty="0" err="1"/>
+              <a:t>Synset</a:t>
+            </a:r>
+            <a:r>
+              <a:rPr lang="en-AU" sz="2000" dirty="0"/>
+              <a:t>('lymphatic_system.n.01'), </a:t>
+            </a:r>
+            <a:r>
+              <a:rPr lang="en-AU" sz="2000" dirty="0" err="1"/>
+              <a:t>Synset</a:t>
+            </a:r>
+            <a:r>
+              <a:rPr lang="en-AU" sz="2000" dirty="0"/>
+              <a:t>('musculoskeletal_system.n.01'), </a:t>
+            </a:r>
+            <a:r>
+              <a:rPr lang="en-AU" sz="2000" dirty="0" err="1"/>
+              <a:t>Synset</a:t>
+            </a:r>
+            <a:r>
+              <a:rPr lang="en-AU" sz="2000" dirty="0"/>
+              <a:t>('neck.n.01'), </a:t>
+            </a:r>
+            <a:r>
+              <a:rPr lang="en-AU" sz="2000" dirty="0" err="1"/>
+              <a:t>Synset</a:t>
+            </a:r>
+            <a:r>
+              <a:rPr lang="en-AU" sz="2000" dirty="0"/>
+              <a:t>('nervous_system.n.01'), </a:t>
+            </a:r>
+            <a:r>
+              <a:rPr lang="en-AU" sz="2000" dirty="0" err="1"/>
+              <a:t>Synset</a:t>
+            </a:r>
+            <a:r>
+              <a:rPr lang="en-AU" sz="2000" dirty="0"/>
+              <a:t>('pressure_point.n.01'), </a:t>
+            </a:r>
+            <a:r>
+              <a:rPr lang="en-AU" sz="2000" dirty="0" err="1"/>
+              <a:t>Synset</a:t>
+            </a:r>
+            <a:r>
+              <a:rPr lang="en-AU" sz="2000" dirty="0"/>
+              <a:t>('respiratory_system.n.01'), </a:t>
+            </a:r>
+            <a:r>
+              <a:rPr lang="en-AU" sz="2000" dirty="0" err="1"/>
+              <a:t>Synset</a:t>
+            </a:r>
+            <a:r>
+              <a:rPr lang="en-AU" sz="2000" dirty="0"/>
+              <a:t>('sensory_system.n.02'), </a:t>
+            </a:r>
+            <a:r>
+              <a:rPr lang="en-AU" sz="2000" dirty="0" err="1"/>
+              <a:t>Synset</a:t>
+            </a:r>
+            <a:r>
+              <a:rPr lang="en-AU" sz="2000" dirty="0"/>
+              <a:t>('torso.n.01'), </a:t>
+            </a:r>
+            <a:r>
+              <a:rPr lang="en-AU" sz="2000" dirty="0" err="1"/>
+              <a:t>Synset</a:t>
+            </a:r>
+            <a:r>
+              <a:rPr lang="en-AU" sz="2000" dirty="0"/>
+              <a:t>(</a:t>
+            </a:r>
+            <a:r>
+              <a:rPr lang="en-AU" sz="2000" dirty="0" smtClean="0"/>
+              <a:t>'vascular_system.n.01')]</a:t>
+            </a:r>
           </a:p>
         </p:txBody>
       </p:sp>

</xml_diff>